<commit_message>
The version for blind review
Only language problems suggested by Zhongbao and JH are implemented
no time for more serious modifications...
</commit_message>
<xml_diff>
--- a/thesis/plots/chpt5/smearer deomonstration.pptx
+++ b/thesis/plots/chpt5/smearer deomonstration.pptx
@@ -288,7 +288,7 @@
           <a:p>
             <a:fld id="{530820CF-B880-4189-942D-D702A7CBA730}" type="datetimeFigureOut">
               <a:rPr lang="zh-CN" altLang="en-US" smtClean="0"/>
-              <a:t>2014/9/9</a:t>
+              <a:t>2014/9/17</a:t>
             </a:fld>
             <a:endParaRPr lang="zh-CN" altLang="en-US"/>
           </a:p>
@@ -453,7 +453,7 @@
           <a:p>
             <a:fld id="{530820CF-B880-4189-942D-D702A7CBA730}" type="datetimeFigureOut">
               <a:rPr lang="zh-CN" altLang="en-US" smtClean="0"/>
-              <a:t>2014/9/9</a:t>
+              <a:t>2014/9/17</a:t>
             </a:fld>
             <a:endParaRPr lang="zh-CN" altLang="en-US"/>
           </a:p>
@@ -628,7 +628,7 @@
           <a:p>
             <a:fld id="{530820CF-B880-4189-942D-D702A7CBA730}" type="datetimeFigureOut">
               <a:rPr lang="zh-CN" altLang="en-US" smtClean="0"/>
-              <a:t>2014/9/9</a:t>
+              <a:t>2014/9/17</a:t>
             </a:fld>
             <a:endParaRPr lang="zh-CN" altLang="en-US"/>
           </a:p>
@@ -793,7 +793,7 @@
           <a:p>
             <a:fld id="{530820CF-B880-4189-942D-D702A7CBA730}" type="datetimeFigureOut">
               <a:rPr lang="zh-CN" altLang="en-US" smtClean="0"/>
-              <a:t>2014/9/9</a:t>
+              <a:t>2014/9/17</a:t>
             </a:fld>
             <a:endParaRPr lang="zh-CN" altLang="en-US"/>
           </a:p>
@@ -1034,7 +1034,7 @@
           <a:p>
             <a:fld id="{530820CF-B880-4189-942D-D702A7CBA730}" type="datetimeFigureOut">
               <a:rPr lang="zh-CN" altLang="en-US" smtClean="0"/>
-              <a:t>2014/9/9</a:t>
+              <a:t>2014/9/17</a:t>
             </a:fld>
             <a:endParaRPr lang="zh-CN" altLang="en-US"/>
           </a:p>
@@ -1317,7 +1317,7 @@
           <a:p>
             <a:fld id="{530820CF-B880-4189-942D-D702A7CBA730}" type="datetimeFigureOut">
               <a:rPr lang="zh-CN" altLang="en-US" smtClean="0"/>
-              <a:t>2014/9/9</a:t>
+              <a:t>2014/9/17</a:t>
             </a:fld>
             <a:endParaRPr lang="zh-CN" altLang="en-US"/>
           </a:p>
@@ -1734,7 +1734,7 @@
           <a:p>
             <a:fld id="{530820CF-B880-4189-942D-D702A7CBA730}" type="datetimeFigureOut">
               <a:rPr lang="zh-CN" altLang="en-US" smtClean="0"/>
-              <a:t>2014/9/9</a:t>
+              <a:t>2014/9/17</a:t>
             </a:fld>
             <a:endParaRPr lang="zh-CN" altLang="en-US"/>
           </a:p>
@@ -1847,7 +1847,7 @@
           <a:p>
             <a:fld id="{530820CF-B880-4189-942D-D702A7CBA730}" type="datetimeFigureOut">
               <a:rPr lang="zh-CN" altLang="en-US" smtClean="0"/>
-              <a:t>2014/9/9</a:t>
+              <a:t>2014/9/17</a:t>
             </a:fld>
             <a:endParaRPr lang="zh-CN" altLang="en-US"/>
           </a:p>
@@ -1937,7 +1937,7 @@
           <a:p>
             <a:fld id="{530820CF-B880-4189-942D-D702A7CBA730}" type="datetimeFigureOut">
               <a:rPr lang="zh-CN" altLang="en-US" smtClean="0"/>
-              <a:t>2014/9/9</a:t>
+              <a:t>2014/9/17</a:t>
             </a:fld>
             <a:endParaRPr lang="zh-CN" altLang="en-US"/>
           </a:p>
@@ -2209,7 +2209,7 @@
           <a:p>
             <a:fld id="{530820CF-B880-4189-942D-D702A7CBA730}" type="datetimeFigureOut">
               <a:rPr lang="zh-CN" altLang="en-US" smtClean="0"/>
-              <a:t>2014/9/9</a:t>
+              <a:t>2014/9/17</a:t>
             </a:fld>
             <a:endParaRPr lang="zh-CN" altLang="en-US"/>
           </a:p>
@@ -2457,7 +2457,7 @@
           <a:p>
             <a:fld id="{530820CF-B880-4189-942D-D702A7CBA730}" type="datetimeFigureOut">
               <a:rPr lang="zh-CN" altLang="en-US" smtClean="0"/>
-              <a:t>2014/9/9</a:t>
+              <a:t>2014/9/17</a:t>
             </a:fld>
             <a:endParaRPr lang="zh-CN" altLang="en-US"/>
           </a:p>
@@ -2665,7 +2665,7 @@
           <a:p>
             <a:fld id="{530820CF-B880-4189-942D-D702A7CBA730}" type="datetimeFigureOut">
               <a:rPr lang="zh-CN" altLang="en-US" smtClean="0"/>
-              <a:t>2014/9/9</a:t>
+              <a:t>2014/9/17</a:t>
             </a:fld>
             <a:endParaRPr lang="zh-CN" altLang="en-US"/>
           </a:p>
@@ -3550,6 +3550,11 @@
                 <a:prstGeom prst="rightBrace">
                   <a:avLst/>
                 </a:prstGeom>
+                <a:ln w="28575">
+                  <a:solidFill>
+                    <a:schemeClr val="tx1"/>
+                  </a:solidFill>
+                </a:ln>
               </p:spPr>
               <p:style>
                 <a:lnRef idx="1">
@@ -3804,6 +3809,11 @@
                   <a:gd name="adj2" fmla="val 49072"/>
                 </a:avLst>
               </a:prstGeom>
+              <a:ln w="28575">
+                <a:solidFill>
+                  <a:schemeClr val="tx1"/>
+                </a:solidFill>
+              </a:ln>
             </p:spPr>
             <p:style>
               <a:lnRef idx="1">

</xml_diff>